<commit_message>
Modification du suivi de la thèse
</commit_message>
<xml_diff>
--- a/Suivi de thèse/Suivi de thèse.pptx
+++ b/Suivi de thèse/Suivi de thèse.pptx
@@ -11,6 +11,7 @@
     <p:sldId id="259" r:id="rId5"/>
     <p:sldId id="260" r:id="rId6"/>
     <p:sldId id="261" r:id="rId7"/>
+    <p:sldId id="263" r:id="rId8"/>
   </p:sldIdLst>
   <p:sldSz cx="12192000" cy="6858000"/>
   <p:notesSz cx="6858000" cy="9144000"/>
@@ -5050,6 +5051,252 @@
 </p:sld>
 </file>
 
+<file path=ppt/slides/slide7.xml><?xml version="1.0" encoding="utf-8"?>
+<p:sld xmlns:a="http://schemas.openxmlformats.org/drawingml/2006/main" xmlns:r="http://schemas.openxmlformats.org/officeDocument/2006/relationships" xmlns:p="http://schemas.openxmlformats.org/presentationml/2006/main">
+  <p:cSld>
+    <p:spTree>
+      <p:nvGrpSpPr>
+        <p:cNvPr id="1" name=""/>
+        <p:cNvGrpSpPr/>
+        <p:nvPr/>
+      </p:nvGrpSpPr>
+      <p:grpSpPr>
+        <a:xfrm>
+          <a:off x="0" y="0"/>
+          <a:ext cx="0" cy="0"/>
+          <a:chOff x="0" y="0"/>
+          <a:chExt cx="0" cy="0"/>
+        </a:xfrm>
+      </p:grpSpPr>
+      <p:pic>
+        <p:nvPicPr>
+          <p:cNvPr id="5" name="Image 4"/>
+          <p:cNvPicPr>
+            <a:picLocks noChangeAspect="1"/>
+          </p:cNvPicPr>
+          <p:nvPr/>
+        </p:nvPicPr>
+        <p:blipFill>
+          <a:blip r:embed="rId2" cstate="print">
+            <a:extLst>
+              <a:ext uri="{28A0092B-C50C-407E-A947-70E740481C1C}">
+                <a14:useLocalDpi xmlns:a14="http://schemas.microsoft.com/office/drawing/2010/main" val="0"/>
+              </a:ext>
+            </a:extLst>
+          </a:blip>
+          <a:stretch>
+            <a:fillRect/>
+          </a:stretch>
+        </p:blipFill>
+        <p:spPr>
+          <a:xfrm flipH="1" flipV="1">
+            <a:off x="5520902" y="0"/>
+            <a:ext cx="6418881" cy="6858000"/>
+          </a:xfrm>
+          <a:prstGeom prst="rect">
+            <a:avLst/>
+          </a:prstGeom>
+        </p:spPr>
+      </p:pic>
+      <p:sp>
+        <p:nvSpPr>
+          <p:cNvPr id="6" name="ZoneTexte 5"/>
+          <p:cNvSpPr txBox="1"/>
+          <p:nvPr/>
+        </p:nvSpPr>
+        <p:spPr>
+          <a:xfrm>
+            <a:off x="0" y="0"/>
+            <a:ext cx="1707134" cy="646331"/>
+          </a:xfrm>
+          <a:prstGeom prst="rect">
+            <a:avLst/>
+          </a:prstGeom>
+          <a:noFill/>
+        </p:spPr>
+        <p:txBody>
+          <a:bodyPr wrap="none" rtlCol="0">
+            <a:spAutoFit/>
+          </a:bodyPr>
+          <a:lstStyle/>
+          <a:p>
+            <a:r>
+              <a:rPr lang="fr-FR" sz="3600" b="1" dirty="0" smtClean="0"/>
+              <a:t>Figure </a:t>
+            </a:r>
+            <a:r>
+              <a:rPr lang="fr-FR" sz="3600" b="1" dirty="0" smtClean="0"/>
+              <a:t>4</a:t>
+            </a:r>
+            <a:endParaRPr lang="fr-FR" sz="3600" b="1" dirty="0"/>
+          </a:p>
+        </p:txBody>
+      </p:sp>
+      <p:graphicFrame>
+        <p:nvGraphicFramePr>
+          <p:cNvPr id="7" name="Tableau 6"/>
+          <p:cNvGraphicFramePr>
+            <a:graphicFrameLocks noGrp="1"/>
+          </p:cNvGraphicFramePr>
+          <p:nvPr>
+            <p:extLst>
+              <p:ext uri="{D42A27DB-BD31-4B8C-83A1-F6EECF244321}">
+                <p14:modId xmlns:p14="http://schemas.microsoft.com/office/powerpoint/2010/main" val="4234187891"/>
+              </p:ext>
+            </p:extLst>
+          </p:nvPr>
+        </p:nvGraphicFramePr>
+        <p:xfrm>
+          <a:off x="856343" y="2460172"/>
+          <a:ext cx="2442030" cy="1171303"/>
+        </p:xfrm>
+        <a:graphic>
+          <a:graphicData uri="http://schemas.openxmlformats.org/drawingml/2006/table">
+            <a:tbl>
+              <a:tblPr firstRow="1" bandRow="1">
+                <a:tableStyleId>{073A0DAA-6AF3-43AB-8588-CEC1D06C72B9}</a:tableStyleId>
+              </a:tblPr>
+              <a:tblGrid>
+                <a:gridCol w="1221015"/>
+                <a:gridCol w="1221015"/>
+              </a:tblGrid>
+              <a:tr h="429623">
+                <a:tc>
+                  <a:txBody>
+                    <a:bodyPr/>
+                    <a:lstStyle/>
+                    <a:p>
+                      <a:pPr algn="ctr"/>
+                      <a:r>
+                        <a:rPr lang="fr-FR" dirty="0" smtClean="0"/>
+                        <a:t>Testé</a:t>
+                      </a:r>
+                      <a:endParaRPr lang="fr-FR" dirty="0"/>
+                    </a:p>
+                  </a:txBody>
+                  <a:tcPr/>
+                </a:tc>
+                <a:tc>
+                  <a:txBody>
+                    <a:bodyPr/>
+                    <a:lstStyle/>
+                    <a:p>
+                      <a:pPr algn="ctr"/>
+                      <a:r>
+                        <a:rPr lang="fr-FR" dirty="0" smtClean="0"/>
+                        <a:t>Oui</a:t>
+                      </a:r>
+                      <a:endParaRPr lang="fr-FR" dirty="0"/>
+                    </a:p>
+                  </a:txBody>
+                  <a:tcPr/>
+                </a:tc>
+              </a:tr>
+              <a:tr h="370840">
+                <a:tc>
+                  <a:txBody>
+                    <a:bodyPr/>
+                    <a:lstStyle/>
+                    <a:p>
+                      <a:pPr algn="ctr"/>
+                      <a:r>
+                        <a:rPr lang="fr-FR" dirty="0" err="1" smtClean="0"/>
+                        <a:t>Nb_it</a:t>
+                      </a:r>
+                      <a:r>
+                        <a:rPr lang="fr-FR" dirty="0" smtClean="0"/>
+                        <a:t> </a:t>
+                      </a:r>
+                      <a:r>
+                        <a:rPr lang="fr-FR" dirty="0" err="1" smtClean="0"/>
+                        <a:t>Opt</a:t>
+                      </a:r>
+                      <a:endParaRPr lang="fr-FR" dirty="0"/>
+                    </a:p>
+                  </a:txBody>
+                  <a:tcPr/>
+                </a:tc>
+                <a:tc>
+                  <a:txBody>
+                    <a:bodyPr/>
+                    <a:lstStyle/>
+                    <a:p>
+                      <a:pPr algn="ctr"/>
+                      <a:r>
+                        <a:rPr lang="fr-FR" b="1" dirty="0" smtClean="0">
+                          <a:solidFill>
+                            <a:srgbClr val="FF0000"/>
+                          </a:solidFill>
+                        </a:rPr>
+                        <a:t>Non</a:t>
+                      </a:r>
+                      <a:endParaRPr lang="fr-FR" b="1" dirty="0">
+                        <a:solidFill>
+                          <a:srgbClr val="FF0000"/>
+                        </a:solidFill>
+                      </a:endParaRPr>
+                    </a:p>
+                  </a:txBody>
+                  <a:tcPr/>
+                </a:tc>
+              </a:tr>
+              <a:tr h="370840">
+                <a:tc>
+                  <a:txBody>
+                    <a:bodyPr/>
+                    <a:lstStyle/>
+                    <a:p>
+                      <a:pPr algn="ctr"/>
+                      <a:r>
+                        <a:rPr lang="fr-FR" dirty="0" smtClean="0"/>
+                        <a:t>Data All</a:t>
+                      </a:r>
+                      <a:endParaRPr lang="fr-FR" dirty="0"/>
+                    </a:p>
+                  </a:txBody>
+                  <a:tcPr/>
+                </a:tc>
+                <a:tc>
+                  <a:txBody>
+                    <a:bodyPr/>
+                    <a:lstStyle/>
+                    <a:p>
+                      <a:pPr algn="ctr"/>
+                      <a:r>
+                        <a:rPr lang="fr-FR" b="1" dirty="0" smtClean="0">
+                          <a:solidFill>
+                            <a:srgbClr val="FF0000"/>
+                          </a:solidFill>
+                        </a:rPr>
+                        <a:t>Non</a:t>
+                      </a:r>
+                      <a:endParaRPr lang="fr-FR" b="1" dirty="0">
+                        <a:solidFill>
+                          <a:srgbClr val="FF0000"/>
+                        </a:solidFill>
+                      </a:endParaRPr>
+                    </a:p>
+                  </a:txBody>
+                  <a:tcPr/>
+                </a:tc>
+              </a:tr>
+            </a:tbl>
+          </a:graphicData>
+        </a:graphic>
+      </p:graphicFrame>
+    </p:spTree>
+    <p:extLst>
+      <p:ext uri="{BB962C8B-B14F-4D97-AF65-F5344CB8AC3E}">
+        <p14:creationId xmlns:p14="http://schemas.microsoft.com/office/powerpoint/2010/main" val="3770590361"/>
+      </p:ext>
+    </p:extLst>
+  </p:cSld>
+  <p:clrMapOvr>
+    <a:masterClrMapping/>
+  </p:clrMapOvr>
+</p:sld>
+</file>
+
 <file path=ppt/theme/theme1.xml><?xml version="1.0" encoding="utf-8"?>
 <a:theme xmlns:a="http://schemas.openxmlformats.org/drawingml/2006/main" name="Thème Office">
   <a:themeElements>

</xml_diff>